<commit_message>
updated slides - cut some fat!
</commit_message>
<xml_diff>
--- a/Slides/Module 06.2 Agile Planning and Estimation.pptx
+++ b/Slides/Module 06.2 Agile Planning and Estimation.pptx
@@ -5,7 +5,7 @@
     <p:sldMasterId id="2147483648" r:id="rId1"/>
   </p:sldMasterIdLst>
   <p:notesMasterIdLst>
-    <p:notesMasterId r:id="rId22"/>
+    <p:notesMasterId r:id="rId21"/>
   </p:notesMasterIdLst>
   <p:sldIdLst>
     <p:sldId id="485" r:id="rId2"/>
@@ -26,34 +26,33 @@
     <p:sldId id="547" r:id="rId17"/>
     <p:sldId id="545" r:id="rId18"/>
     <p:sldId id="543" r:id="rId19"/>
-    <p:sldId id="272" r:id="rId20"/>
-    <p:sldId id="518" r:id="rId21"/>
+    <p:sldId id="518" r:id="rId20"/>
   </p:sldIdLst>
   <p:sldSz cx="12192000" cy="6858000"/>
   <p:notesSz cx="6858000" cy="9144000"/>
   <p:embeddedFontLst>
     <p:embeddedFont>
       <p:font typeface="Calibri" panose="020F0502020204030204" pitchFamily="34" charset="0"/>
-      <p:regular r:id="rId23"/>
-      <p:bold r:id="rId24"/>
-      <p:italic r:id="rId25"/>
-      <p:boldItalic r:id="rId26"/>
+      <p:regular r:id="rId22"/>
+      <p:bold r:id="rId23"/>
+      <p:italic r:id="rId24"/>
+      <p:boldItalic r:id="rId25"/>
     </p:embeddedFont>
     <p:embeddedFont>
       <p:font typeface="Calibri Light" panose="020F0302020204030204" pitchFamily="34" charset="0"/>
-      <p:regular r:id="rId27"/>
-      <p:italic r:id="rId28"/>
+      <p:regular r:id="rId26"/>
+      <p:italic r:id="rId27"/>
     </p:embeddedFont>
     <p:embeddedFont>
       <p:font typeface="Ink Free" panose="03080402000500000000" pitchFamily="66" charset="0"/>
-      <p:regular r:id="rId29"/>
+      <p:regular r:id="rId28"/>
     </p:embeddedFont>
     <p:embeddedFont>
       <p:font typeface="Verdana" panose="020B0604030504040204" pitchFamily="34" charset="0"/>
-      <p:regular r:id="rId30"/>
-      <p:bold r:id="rId31"/>
-      <p:italic r:id="rId32"/>
-      <p:boldItalic r:id="rId33"/>
+      <p:regular r:id="rId29"/>
+      <p:bold r:id="rId30"/>
+      <p:italic r:id="rId31"/>
+      <p:boldItalic r:id="rId32"/>
     </p:embeddedFont>
   </p:embeddedFontLst>
   <p:defaultTextStyle>
@@ -174,7 +173,6 @@
             <p14:sldId id="547"/>
             <p14:sldId id="545"/>
             <p14:sldId id="543"/>
-            <p14:sldId id="272"/>
             <p14:sldId id="518"/>
           </p14:sldIdLst>
         </p14:section>
@@ -269,7 +267,7 @@
           <a:p>
             <a:fld id="{7C7E5181-6CF5-45F7-A87A-E0E0B1FD7549}" type="datetimeFigureOut">
               <a:rPr lang="en-US" smtClean="0"/>
-              <a:t>9/5/2022</a:t>
+              <a:t>9/16/2022</a:t>
             </a:fld>
             <a:endParaRPr lang="en-US"/>
           </a:p>
@@ -900,34 +898,22 @@
             </a:r>
           </a:p>
           <a:p>
-            <a:endParaRPr lang="en-US" dirty="0"/>
-          </a:p>
-          <a:p>
             <a:r>
               <a:rPr lang="en-US" dirty="0"/>
               <a:t>M – maybe things we have experience with, but not that exact task.</a:t>
             </a:r>
           </a:p>
           <a:p>
-            <a:endParaRPr lang="en-US" dirty="0"/>
-          </a:p>
-          <a:p>
             <a:r>
               <a:rPr lang="en-US" dirty="0"/>
               <a:t>L– challenging task that will need investigation. </a:t>
             </a:r>
           </a:p>
           <a:p>
-            <a:br>
-              <a:rPr lang="en-US" dirty="0"/>
-            </a:br>
             <a:r>
               <a:rPr lang="en-US" dirty="0"/>
               <a:t>XL – huge amount of work and complexity. </a:t>
             </a:r>
-          </a:p>
-          <a:p>
-            <a:endParaRPr lang="en-US" dirty="0"/>
           </a:p>
           <a:p>
             <a:r>
@@ -1904,23 +1890,255 @@
             <a:endParaRPr lang="en-US" dirty="0"/>
           </a:p>
           <a:p>
+            <a:r>
+              <a:rPr lang="en-US" dirty="0"/>
+              <a:t>Everyone’s biggest question with estimation is: “When will the feature (or entire project) be delivered?”</a:t>
+            </a:r>
+          </a:p>
+          <a:p>
+            <a:r>
+              <a:rPr lang="en-US" dirty="0"/>
+              <a:t>This is a hard question to answer, and Agile offers no silver bullet here. This process provides us with a regular opportunity to reflect on the overall project velocity, however. If we estimate each remaining user story as a t-shirt size, how many large, medium, and smalls are left? We can calculate metrics of how quickly we tend to finish those tasks… But it’s all still just an estimate! :/ </a:t>
+            </a:r>
+          </a:p>
+          <a:p>
             <a:endParaRPr lang="en-US" dirty="0"/>
           </a:p>
           <a:p>
             <a:r>
               <a:rPr lang="en-US" dirty="0"/>
-              <a:t>Everyone’s biggest question with estimation is: “When will the feature (or entire project) be delivered?”</a:t>
-            </a:r>
-          </a:p>
-          <a:p>
-            <a:r>
-              <a:rPr lang="en-US" dirty="0"/>
-              <a:t>This is a hard question to answer, and Agile offers no silver bullet here. This process provides us with a regular opportunity to reflect on the overall project velocity, however. If we estimate each remaining user story as a t-shirt size, how many large, medium, and smalls are left? We can calculate metrics of how quickly we tend to finish those tasks… But it’s all still just an estimate! </a:t>
-            </a:r>
-            <a:r>
-              <a:rPr lang="en-US"/>
-              <a:t>:/ </a:t>
-            </a:r>
+              <a:t>One related questions often is: Why are projects late?</a:t>
+            </a:r>
+            <a:br>
+              <a:rPr lang="en-US" dirty="0"/>
+            </a:br>
+            <a:r>
+              <a:rPr lang="en-US" dirty="0"/>
+              <a:t>Here are some reasons: </a:t>
+            </a:r>
+          </a:p>
+          <a:p>
+            <a:pPr>
+              <a:spcBef>
+                <a:spcPts val="703"/>
+              </a:spcBef>
+            </a:pPr>
+            <a:r>
+              <a:rPr lang="en-US" altLang="en-US" sz="1200" dirty="0">
+                <a:solidFill>
+                  <a:srgbClr val="000000"/>
+                </a:solidFill>
+              </a:rPr>
+              <a:t>* an </a:t>
+            </a:r>
+            <a:r>
+              <a:rPr lang="en-US" altLang="en-US" sz="1200" dirty="0">
+                <a:solidFill>
+                  <a:srgbClr val="C00000"/>
+                </a:solidFill>
+              </a:rPr>
+              <a:t>unrealistic deadline </a:t>
+            </a:r>
+            <a:r>
+              <a:rPr lang="en-US" altLang="en-US" sz="1200" dirty="0">
+                <a:solidFill>
+                  <a:srgbClr val="000000"/>
+                </a:solidFill>
+              </a:rPr>
+              <a:t>established by someone outside the software development group</a:t>
+            </a:r>
+          </a:p>
+          <a:p>
+            <a:pPr>
+              <a:spcBef>
+                <a:spcPts val="703"/>
+              </a:spcBef>
+            </a:pPr>
+            <a:r>
+              <a:rPr lang="en-US" altLang="en-US" sz="1200" dirty="0">
+                <a:solidFill>
+                  <a:srgbClr val="C00000"/>
+                </a:solidFill>
+              </a:rPr>
+              <a:t>* changing customer requirements </a:t>
+            </a:r>
+            <a:r>
+              <a:rPr lang="en-US" altLang="en-US" sz="1200" dirty="0">
+                <a:solidFill>
+                  <a:srgbClr val="000000"/>
+                </a:solidFill>
+              </a:rPr>
+              <a:t>that are not reflected in schedule changes;</a:t>
+            </a:r>
+          </a:p>
+          <a:p>
+            <a:pPr>
+              <a:spcBef>
+                <a:spcPts val="703"/>
+              </a:spcBef>
+            </a:pPr>
+            <a:r>
+              <a:rPr lang="en-US" altLang="en-US" sz="1200" dirty="0">
+                <a:solidFill>
+                  <a:srgbClr val="000000"/>
+                </a:solidFill>
+              </a:rPr>
+              <a:t>* an </a:t>
+            </a:r>
+            <a:r>
+              <a:rPr lang="en-US" altLang="en-US" sz="1200" dirty="0">
+                <a:solidFill>
+                  <a:srgbClr val="C00000"/>
+                </a:solidFill>
+              </a:rPr>
+              <a:t>honest underestimate </a:t>
+            </a:r>
+            <a:r>
+              <a:rPr lang="en-US" altLang="en-US" sz="1200" dirty="0">
+                <a:solidFill>
+                  <a:srgbClr val="000000"/>
+                </a:solidFill>
+              </a:rPr>
+              <a:t>of the amount of effort and/or the number of resources that will be required to do the job;</a:t>
+            </a:r>
+          </a:p>
+          <a:p>
+            <a:pPr>
+              <a:spcBef>
+                <a:spcPts val="703"/>
+              </a:spcBef>
+            </a:pPr>
+            <a:r>
+              <a:rPr lang="en-US" altLang="en-US" sz="1200" dirty="0">
+                <a:solidFill>
+                  <a:srgbClr val="C00000"/>
+                </a:solidFill>
+              </a:rPr>
+              <a:t>* predictable and/or unpredictable risks </a:t>
+            </a:r>
+            <a:r>
+              <a:rPr lang="en-US" altLang="en-US" sz="1200" dirty="0">
+                <a:solidFill>
+                  <a:srgbClr val="000000"/>
+                </a:solidFill>
+              </a:rPr>
+              <a:t>that were not considered when the project commenced;</a:t>
+            </a:r>
+          </a:p>
+          <a:p>
+            <a:pPr>
+              <a:spcBef>
+                <a:spcPts val="703"/>
+              </a:spcBef>
+            </a:pPr>
+            <a:r>
+              <a:rPr lang="en-US" altLang="en-US" sz="1200" dirty="0">
+                <a:solidFill>
+                  <a:srgbClr val="C00000"/>
+                </a:solidFill>
+              </a:rPr>
+              <a:t>* technical difficulties </a:t>
+            </a:r>
+            <a:r>
+              <a:rPr lang="en-US" altLang="en-US" sz="1200" dirty="0">
+                <a:solidFill>
+                  <a:srgbClr val="000000"/>
+                </a:solidFill>
+              </a:rPr>
+              <a:t>that could not have been foreseen in advance;</a:t>
+            </a:r>
+          </a:p>
+          <a:p>
+            <a:pPr>
+              <a:spcBef>
+                <a:spcPts val="703"/>
+              </a:spcBef>
+            </a:pPr>
+            <a:r>
+              <a:rPr lang="en-US" altLang="en-US" sz="1200" dirty="0">
+                <a:solidFill>
+                  <a:srgbClr val="C00000"/>
+                </a:solidFill>
+              </a:rPr>
+              <a:t>* human difficulties </a:t>
+            </a:r>
+            <a:r>
+              <a:rPr lang="en-US" altLang="en-US" sz="1200" dirty="0">
+                <a:solidFill>
+                  <a:srgbClr val="000000"/>
+                </a:solidFill>
+              </a:rPr>
+              <a:t>that could not have been foreseen in advance;</a:t>
+            </a:r>
+          </a:p>
+          <a:p>
+            <a:pPr>
+              <a:spcBef>
+                <a:spcPts val="703"/>
+              </a:spcBef>
+            </a:pPr>
+            <a:r>
+              <a:rPr lang="en-US" altLang="en-US" sz="1200" dirty="0">
+                <a:solidFill>
+                  <a:srgbClr val="C00000"/>
+                </a:solidFill>
+              </a:rPr>
+              <a:t>* miscommunication</a:t>
+            </a:r>
+            <a:r>
+              <a:rPr lang="en-US" altLang="en-US" sz="1200" dirty="0">
+                <a:solidFill>
+                  <a:srgbClr val="000000"/>
+                </a:solidFill>
+              </a:rPr>
+              <a:t> among project staff that results in delays;</a:t>
+            </a:r>
+          </a:p>
+          <a:p>
+            <a:pPr>
+              <a:spcBef>
+                <a:spcPts val="703"/>
+              </a:spcBef>
+            </a:pPr>
+            <a:r>
+              <a:rPr lang="en-US" altLang="en-US" sz="1200" dirty="0">
+                <a:solidFill>
+                  <a:srgbClr val="000000"/>
+                </a:solidFill>
+              </a:rPr>
+              <a:t>* a failure by project management to recognize that the project is </a:t>
+            </a:r>
+            <a:r>
+              <a:rPr lang="en-US" altLang="en-US" sz="1200" dirty="0">
+                <a:solidFill>
+                  <a:srgbClr val="C00000"/>
+                </a:solidFill>
+              </a:rPr>
+              <a:t>falling behind schedule</a:t>
+            </a:r>
+            <a:r>
+              <a:rPr lang="en-US" altLang="en-US" sz="1200" dirty="0">
+                <a:solidFill>
+                  <a:srgbClr val="000000"/>
+                </a:solidFill>
+              </a:rPr>
+              <a:t> and a </a:t>
+            </a:r>
+            <a:r>
+              <a:rPr lang="en-US" altLang="en-US" sz="1200" dirty="0">
+                <a:solidFill>
+                  <a:srgbClr val="C00000"/>
+                </a:solidFill>
+              </a:rPr>
+              <a:t>lack of action to correct the problem</a:t>
+            </a:r>
+            <a:endParaRPr lang="en-US" altLang="en-US" sz="1000" dirty="0">
+              <a:solidFill>
+                <a:srgbClr val="C00000"/>
+              </a:solidFill>
+            </a:endParaRPr>
+          </a:p>
+          <a:p>
             <a:endParaRPr lang="en-US" dirty="0"/>
           </a:p>
         </p:txBody>
@@ -2006,7 +2224,7 @@
           <a:lstStyle/>
           <a:p>
             <a:r>
-              <a:rPr lang="en-US"/>
+              <a:rPr lang="en-US" dirty="0"/>
               <a:t>&lt;read slide&gt;</a:t>
             </a:r>
           </a:p>
@@ -2038,7 +2256,7 @@
     </p:spTree>
     <p:extLst>
       <p:ext uri="{BB962C8B-B14F-4D97-AF65-F5344CB8AC3E}">
-        <p14:creationId xmlns:p14="http://schemas.microsoft.com/office/powerpoint/2010/main" val="1509609614"/>
+        <p14:creationId xmlns:p14="http://schemas.microsoft.com/office/powerpoint/2010/main" val="3813056222"/>
       </p:ext>
     </p:extLst>
   </p:cSld>
@@ -2135,93 +2353,6 @@
 </p:notes>
 </file>
 
-<file path=ppt/notesSlides/notesSlide20.xml><?xml version="1.0" encoding="utf-8"?>
-<p:notes xmlns:a="http://schemas.openxmlformats.org/drawingml/2006/main" xmlns:r="http://schemas.openxmlformats.org/officeDocument/2006/relationships" xmlns:p="http://schemas.openxmlformats.org/presentationml/2006/main">
-  <p:cSld>
-    <p:spTree>
-      <p:nvGrpSpPr>
-        <p:cNvPr id="1" name=""/>
-        <p:cNvGrpSpPr/>
-        <p:nvPr/>
-      </p:nvGrpSpPr>
-      <p:grpSpPr>
-        <a:xfrm>
-          <a:off x="0" y="0"/>
-          <a:ext cx="0" cy="0"/>
-          <a:chOff x="0" y="0"/>
-          <a:chExt cx="0" cy="0"/>
-        </a:xfrm>
-      </p:grpSpPr>
-      <p:sp>
-        <p:nvSpPr>
-          <p:cNvPr id="2" name="Slide Image Placeholder 1"/>
-          <p:cNvSpPr>
-            <a:spLocks noGrp="1" noRot="1" noChangeAspect="1"/>
-          </p:cNvSpPr>
-          <p:nvPr>
-            <p:ph type="sldImg"/>
-          </p:nvPr>
-        </p:nvSpPr>
-        <p:spPr/>
-      </p:sp>
-      <p:sp>
-        <p:nvSpPr>
-          <p:cNvPr id="3" name="Notes Placeholder 2"/>
-          <p:cNvSpPr>
-            <a:spLocks noGrp="1"/>
-          </p:cNvSpPr>
-          <p:nvPr>
-            <p:ph type="body" idx="1"/>
-          </p:nvPr>
-        </p:nvSpPr>
-        <p:spPr/>
-        <p:txBody>
-          <a:bodyPr/>
-          <a:lstStyle/>
-          <a:p>
-            <a:r>
-              <a:rPr lang="en-US" dirty="0"/>
-              <a:t>&lt;read slide&gt;</a:t>
-            </a:r>
-          </a:p>
-        </p:txBody>
-      </p:sp>
-      <p:sp>
-        <p:nvSpPr>
-          <p:cNvPr id="4" name="Slide Number Placeholder 3"/>
-          <p:cNvSpPr>
-            <a:spLocks noGrp="1"/>
-          </p:cNvSpPr>
-          <p:nvPr>
-            <p:ph type="sldNum" sz="quarter" idx="5"/>
-          </p:nvPr>
-        </p:nvSpPr>
-        <p:spPr/>
-        <p:txBody>
-          <a:bodyPr/>
-          <a:lstStyle/>
-          <a:p>
-            <a:fld id="{07937F07-1250-4CCE-B198-1B2887014F41}" type="slidenum">
-              <a:rPr lang="en-US" smtClean="0"/>
-              <a:t>20</a:t>
-            </a:fld>
-            <a:endParaRPr lang="en-US"/>
-          </a:p>
-        </p:txBody>
-      </p:sp>
-    </p:spTree>
-    <p:extLst>
-      <p:ext uri="{BB962C8B-B14F-4D97-AF65-F5344CB8AC3E}">
-        <p14:creationId xmlns:p14="http://schemas.microsoft.com/office/powerpoint/2010/main" val="3813056222"/>
-      </p:ext>
-    </p:extLst>
-  </p:cSld>
-  <p:clrMapOvr>
-    <a:masterClrMapping/>
-  </p:clrMapOvr>
-</p:notes>
-</file>
-
 <file path=ppt/notesSlides/notesSlide3.xml><?xml version="1.0" encoding="utf-8"?>
 <p:notes xmlns:a="http://schemas.openxmlformats.org/drawingml/2006/main" xmlns:r="http://schemas.openxmlformats.org/officeDocument/2006/relationships" xmlns:p="http://schemas.openxmlformats.org/presentationml/2006/main">
   <p:cSld>
@@ -2285,7 +2416,7 @@
             </a:pPr>
             <a:r>
               <a:rPr lang="en-US" dirty="0"/>
-              <a:t>Recall that in lesson 3.1, in the context of requirements, we talked briefly about how it can be difficult to determine which requirements we could actually implement. Assuming that we are starting off on some new project, we might be negotiating the requirements for the project with a customer – having an opportunity to determine the scope and quality of a project, given a certain cost, and possibly given a certain duration.</a:t>
+              <a:t>Recall that in Module 1.2, in the context of requirements, we talked briefly about how it can be difficult to determine which requirements we could actually implement. Assuming that we are starting off on some new project, we might be negotiating the requirements for the project with a customer – having an opportunity to determine the scope and quality of a project, given a certain cost, and possibly given a certain duration.</a:t>
             </a:r>
           </a:p>
           <a:p>
@@ -2328,15 +2459,7 @@
             </a:pPr>
             <a:r>
               <a:rPr lang="en-US" dirty="0"/>
-              <a:t>(Maybe you did an example for user story generation like the snow plow app: that example would be </a:t>
-            </a:r>
-            <a:r>
-              <a:rPr lang="en-US" dirty="0" err="1"/>
-              <a:t>ncie</a:t>
-            </a:r>
-            <a:r>
-              <a:rPr lang="en-US" dirty="0"/>
-              <a:t> to reference here – “Remember how many different features we came up with? How the heck do we pick some?”</a:t>
+              <a:t>(Maybe you did an example for user story generation like the snow plow app: that example would be nice to reference here – “Remember how many different features we came up with? How the heck do we pick some?”</a:t>
             </a:r>
           </a:p>
           <a:p>
@@ -3380,7 +3503,7 @@
           <a:p>
             <a:fld id="{5D2A64DE-480B-420F-9649-4F8E696E08E0}" type="datetime1">
               <a:rPr lang="en-US" smtClean="0"/>
-              <a:t>9/5/2022</a:t>
+              <a:t>9/16/2022</a:t>
             </a:fld>
             <a:endParaRPr lang="en-US"/>
           </a:p>
@@ -3704,7 +3827,7 @@
           <a:p>
             <a:fld id="{EA476A42-A091-4468-A075-64A31BE59948}" type="datetime1">
               <a:rPr lang="en-US" smtClean="0"/>
-              <a:t>9/5/2022</a:t>
+              <a:t>9/16/2022</a:t>
             </a:fld>
             <a:endParaRPr lang="en-US"/>
           </a:p>
@@ -3902,7 +4025,7 @@
           <a:p>
             <a:fld id="{0D3616D0-8311-4107-9726-6B805E7D05BA}" type="datetime1">
               <a:rPr lang="en-US" smtClean="0"/>
-              <a:t>9/5/2022</a:t>
+              <a:t>9/16/2022</a:t>
             </a:fld>
             <a:endParaRPr lang="en-US"/>
           </a:p>
@@ -4110,7 +4233,7 @@
           <a:p>
             <a:fld id="{3BC2557A-5C88-417A-A763-5AC779462A5F}" type="datetime1">
               <a:rPr lang="en-US" smtClean="0"/>
-              <a:t>9/5/2022</a:t>
+              <a:t>9/16/2022</a:t>
             </a:fld>
             <a:endParaRPr lang="en-US"/>
           </a:p>
@@ -4634,7 +4757,7 @@
           <a:p>
             <a:fld id="{07C7BFD4-467E-4EDE-93EA-052F5B39A4E5}" type="datetime1">
               <a:rPr lang="en-US" smtClean="0"/>
-              <a:t>9/5/2022</a:t>
+              <a:t>9/16/2022</a:t>
             </a:fld>
             <a:endParaRPr lang="en-US"/>
           </a:p>
@@ -4884,7 +5007,7 @@
           <a:p>
             <a:fld id="{07C7BFD4-467E-4EDE-93EA-052F5B39A4E5}" type="datetime1">
               <a:rPr lang="en-US" smtClean="0"/>
-              <a:t>9/5/2022</a:t>
+              <a:t>9/16/2022</a:t>
             </a:fld>
             <a:endParaRPr lang="en-US"/>
           </a:p>
@@ -5066,7 +5189,7 @@
           <a:p>
             <a:fld id="{109E55A0-C911-4F03-82FC-7E5926047D46}" type="datetime1">
               <a:rPr lang="en-US" smtClean="0"/>
-              <a:t>9/5/2022</a:t>
+              <a:t>9/16/2022</a:t>
             </a:fld>
             <a:endParaRPr lang="en-US"/>
           </a:p>
@@ -5379,7 +5502,7 @@
           <a:p>
             <a:fld id="{A533CBE2-D5BE-47AC-ADC2-9CDFC1D0CF90}" type="datetime1">
               <a:rPr lang="en-US" smtClean="0"/>
-              <a:t>9/5/2022</a:t>
+              <a:t>9/16/2022</a:t>
             </a:fld>
             <a:endParaRPr lang="en-US"/>
           </a:p>
@@ -5680,7 +5803,7 @@
           <a:p>
             <a:fld id="{39B7EDB1-CE74-4951-85A2-0B01C2128E28}" type="datetime1">
               <a:rPr lang="en-US" smtClean="0"/>
-              <a:t>9/5/2022</a:t>
+              <a:t>9/16/2022</a:t>
             </a:fld>
             <a:endParaRPr lang="en-US"/>
           </a:p>
@@ -6128,7 +6251,7 @@
           <a:p>
             <a:fld id="{2BC7EB92-A5C2-4807-A9DC-9EDE6CBFB241}" type="datetime1">
               <a:rPr lang="en-US" smtClean="0"/>
-              <a:t>9/5/2022</a:t>
+              <a:t>9/16/2022</a:t>
             </a:fld>
             <a:endParaRPr lang="en-US"/>
           </a:p>
@@ -6241,7 +6364,7 @@
           <a:p>
             <a:fld id="{2B7B7EE0-7771-4CD5-9B2B-3550753A54A1}" type="datetime1">
               <a:rPr lang="en-US" smtClean="0"/>
-              <a:t>9/5/2022</a:t>
+              <a:t>9/16/2022</a:t>
             </a:fld>
             <a:endParaRPr lang="en-US"/>
           </a:p>
@@ -6552,7 +6675,7 @@
           <a:p>
             <a:fld id="{F8B318B3-0E87-4416-A9B8-D891968C2727}" type="datetime1">
               <a:rPr lang="en-US" smtClean="0"/>
-              <a:t>9/5/2022</a:t>
+              <a:t>9/16/2022</a:t>
             </a:fld>
             <a:endParaRPr lang="en-US"/>
           </a:p>
@@ -6793,7 +6916,7 @@
           <a:p>
             <a:fld id="{54D997E8-DDEE-43F1-8D9B-F8A1E11DE488}" type="datetime1">
               <a:rPr lang="en-US" smtClean="0"/>
-              <a:t>9/5/2022</a:t>
+              <a:t>9/16/2022</a:t>
             </a:fld>
             <a:endParaRPr lang="en-US"/>
           </a:p>
@@ -7252,7 +7375,7 @@
               <a:rPr lang="en-US" altLang="en-US" sz="3200" dirty="0">
                 <a:sym typeface="Helvetica Neue" charset="0"/>
               </a:rPr>
-              <a:t>Lesson </a:t>
+              <a:t>Module </a:t>
             </a:r>
             <a:r>
               <a:rPr lang="en-US" altLang="en-US" dirty="0">
@@ -9788,15 +9911,15 @@
       </p:grpSpPr>
       <p:sp>
         <p:nvSpPr>
-          <p:cNvPr id="24577" name="Rectangle 1">
-            <a:extLst>
-              <a:ext uri="{FF2B5EF4-FFF2-40B4-BE49-F238E27FC236}">
-                <a16:creationId xmlns:a16="http://schemas.microsoft.com/office/drawing/2014/main" id="{0F552F37-95EA-4CA9-A51E-15845F77768D}"/>
-              </a:ext>
-            </a:extLst>
-          </p:cNvPr>
-          <p:cNvSpPr>
-            <a:spLocks noGrp="1" noChangeArrowheads="1"/>
+          <p:cNvPr id="2" name="Title 1">
+            <a:extLst>
+              <a:ext uri="{FF2B5EF4-FFF2-40B4-BE49-F238E27FC236}">
+                <a16:creationId xmlns:a16="http://schemas.microsoft.com/office/drawing/2014/main" id="{E743D407-5B53-49A7-9907-E801EA7FFD8E}"/>
+              </a:ext>
+            </a:extLst>
+          </p:cNvPr>
+          <p:cNvSpPr>
+            <a:spLocks noGrp="1"/>
           </p:cNvSpPr>
           <p:nvPr>
             <p:ph type="title"/>
@@ -9804,376 +9927,100 @@
         </p:nvSpPr>
         <p:spPr/>
         <p:txBody>
-          <a:bodyPr>
-            <a:normAutofit/>
-          </a:bodyPr>
-          <a:lstStyle/>
-          <a:p>
-            <a:r>
-              <a:rPr lang="en-US" altLang="en-US" sz="3600" dirty="0">
-                <a:solidFill>
-                  <a:srgbClr val="0070C0"/>
-                </a:solidFill>
-              </a:rPr>
-              <a:t>Why are Projects Late?</a:t>
-            </a:r>
-          </a:p>
-        </p:txBody>
-      </p:sp>
-      <p:sp>
-        <p:nvSpPr>
-          <p:cNvPr id="24578" name="Rectangle 2">
-            <a:extLst>
-              <a:ext uri="{FF2B5EF4-FFF2-40B4-BE49-F238E27FC236}">
-                <a16:creationId xmlns:a16="http://schemas.microsoft.com/office/drawing/2014/main" id="{0D5EEEC1-D5A1-4F56-953F-89717CF26340}"/>
-              </a:ext>
-            </a:extLst>
-          </p:cNvPr>
-          <p:cNvSpPr>
-            <a:spLocks noGrp="1" noChangeArrowheads="1"/>
-          </p:cNvSpPr>
-          <p:nvPr>
-            <p:ph type="body" idx="1"/>
-          </p:nvPr>
-        </p:nvSpPr>
-        <p:spPr>
-          <a:xfrm>
-            <a:off x="838199" y="1500159"/>
-            <a:ext cx="9948333" cy="4714373"/>
-          </a:xfrm>
-        </p:spPr>
-        <p:txBody>
-          <a:bodyPr>
-            <a:normAutofit/>
-          </a:bodyPr>
-          <a:lstStyle/>
-          <a:p>
-            <a:pPr>
-              <a:spcBef>
-                <a:spcPts val="703"/>
-              </a:spcBef>
-            </a:pPr>
-            <a:r>
-              <a:rPr lang="en-US" altLang="en-US" sz="2400" dirty="0">
-                <a:solidFill>
-                  <a:srgbClr val="000000"/>
-                </a:solidFill>
-              </a:rPr>
-              <a:t>an </a:t>
-            </a:r>
-            <a:r>
-              <a:rPr lang="en-US" altLang="en-US" sz="2400" dirty="0">
-                <a:solidFill>
-                  <a:srgbClr val="C00000"/>
-                </a:solidFill>
-              </a:rPr>
-              <a:t>unrealistic deadline </a:t>
-            </a:r>
-            <a:r>
-              <a:rPr lang="en-US" altLang="en-US" sz="2400" dirty="0">
-                <a:solidFill>
-                  <a:srgbClr val="000000"/>
-                </a:solidFill>
-              </a:rPr>
-              <a:t>established by someone outside the software development group</a:t>
-            </a:r>
-          </a:p>
-          <a:p>
-            <a:pPr>
-              <a:spcBef>
-                <a:spcPts val="703"/>
-              </a:spcBef>
-            </a:pPr>
-            <a:r>
-              <a:rPr lang="en-US" altLang="en-US" sz="2400" dirty="0">
-                <a:solidFill>
-                  <a:srgbClr val="C00000"/>
-                </a:solidFill>
-              </a:rPr>
-              <a:t>changing customer requirements </a:t>
-            </a:r>
-            <a:r>
-              <a:rPr lang="en-US" altLang="en-US" sz="2400" dirty="0">
-                <a:solidFill>
-                  <a:srgbClr val="000000"/>
-                </a:solidFill>
-              </a:rPr>
-              <a:t>that are not reflected in schedule changes;</a:t>
-            </a:r>
-          </a:p>
-          <a:p>
-            <a:pPr>
-              <a:spcBef>
-                <a:spcPts val="703"/>
-              </a:spcBef>
-            </a:pPr>
-            <a:r>
-              <a:rPr lang="en-US" altLang="en-US" sz="2400" dirty="0">
-                <a:solidFill>
-                  <a:srgbClr val="000000"/>
-                </a:solidFill>
-              </a:rPr>
-              <a:t>an </a:t>
-            </a:r>
-            <a:r>
-              <a:rPr lang="en-US" altLang="en-US" sz="2400" dirty="0">
-                <a:solidFill>
-                  <a:srgbClr val="C00000"/>
-                </a:solidFill>
-              </a:rPr>
-              <a:t>honest underestimate </a:t>
-            </a:r>
-            <a:r>
-              <a:rPr lang="en-US" altLang="en-US" sz="2400" dirty="0">
-                <a:solidFill>
-                  <a:srgbClr val="000000"/>
-                </a:solidFill>
-              </a:rPr>
-              <a:t>of the amount of effort and/or the number of resources that will be required to do the job;</a:t>
-            </a:r>
-          </a:p>
-          <a:p>
-            <a:pPr>
-              <a:spcBef>
-                <a:spcPts val="703"/>
-              </a:spcBef>
-            </a:pPr>
-            <a:r>
-              <a:rPr lang="en-US" altLang="en-US" sz="2400" dirty="0">
-                <a:solidFill>
-                  <a:srgbClr val="C00000"/>
-                </a:solidFill>
-              </a:rPr>
-              <a:t>predictable and/or unpredictable risks </a:t>
-            </a:r>
-            <a:r>
-              <a:rPr lang="en-US" altLang="en-US" sz="2400" dirty="0">
-                <a:solidFill>
-                  <a:srgbClr val="000000"/>
-                </a:solidFill>
-              </a:rPr>
-              <a:t>that were not considered when the project commenced;</a:t>
-            </a:r>
-          </a:p>
-          <a:p>
-            <a:pPr>
-              <a:spcBef>
-                <a:spcPts val="703"/>
-              </a:spcBef>
-            </a:pPr>
-            <a:r>
-              <a:rPr lang="en-US" altLang="en-US" sz="2400" dirty="0">
-                <a:solidFill>
-                  <a:srgbClr val="C00000"/>
-                </a:solidFill>
-              </a:rPr>
-              <a:t>technical difficulties </a:t>
-            </a:r>
-            <a:r>
-              <a:rPr lang="en-US" altLang="en-US" sz="2400" dirty="0">
-                <a:solidFill>
-                  <a:srgbClr val="000000"/>
-                </a:solidFill>
-              </a:rPr>
-              <a:t>that could not have been foreseen in advance;</a:t>
-            </a:r>
-          </a:p>
-          <a:p>
-            <a:pPr>
-              <a:spcBef>
-                <a:spcPts val="703"/>
-              </a:spcBef>
-            </a:pPr>
-            <a:r>
-              <a:rPr lang="en-US" altLang="en-US" sz="2400" dirty="0">
-                <a:solidFill>
-                  <a:srgbClr val="C00000"/>
-                </a:solidFill>
-              </a:rPr>
-              <a:t>human difficulties </a:t>
-            </a:r>
-            <a:r>
-              <a:rPr lang="en-US" altLang="en-US" sz="2400" dirty="0">
-                <a:solidFill>
-                  <a:srgbClr val="000000"/>
-                </a:solidFill>
-              </a:rPr>
-              <a:t>that could not have been foreseen in advance;</a:t>
-            </a:r>
-          </a:p>
-          <a:p>
-            <a:pPr>
-              <a:spcBef>
-                <a:spcPts val="703"/>
-              </a:spcBef>
-            </a:pPr>
-            <a:r>
-              <a:rPr lang="en-US" altLang="en-US" sz="2400" dirty="0">
-                <a:solidFill>
-                  <a:srgbClr val="C00000"/>
-                </a:solidFill>
-              </a:rPr>
-              <a:t>miscommunication</a:t>
-            </a:r>
-            <a:r>
-              <a:rPr lang="en-US" altLang="en-US" sz="2400" dirty="0">
-                <a:solidFill>
-                  <a:srgbClr val="000000"/>
-                </a:solidFill>
-              </a:rPr>
-              <a:t> among project staff that results in delays;</a:t>
-            </a:r>
-          </a:p>
-          <a:p>
-            <a:pPr>
-              <a:spcBef>
-                <a:spcPts val="703"/>
-              </a:spcBef>
-            </a:pPr>
-            <a:r>
-              <a:rPr lang="en-US" altLang="en-US" sz="2400" dirty="0">
-                <a:solidFill>
-                  <a:srgbClr val="000000"/>
-                </a:solidFill>
-              </a:rPr>
-              <a:t>a failure by project management to recognize that the project is </a:t>
-            </a:r>
-            <a:r>
-              <a:rPr lang="en-US" altLang="en-US" sz="2400" dirty="0">
-                <a:solidFill>
-                  <a:srgbClr val="C00000"/>
-                </a:solidFill>
-              </a:rPr>
-              <a:t>falling behind schedule</a:t>
-            </a:r>
-            <a:r>
-              <a:rPr lang="en-US" altLang="en-US" sz="2400" dirty="0">
-                <a:solidFill>
-                  <a:srgbClr val="000000"/>
-                </a:solidFill>
-              </a:rPr>
-              <a:t> and a </a:t>
-            </a:r>
-            <a:r>
-              <a:rPr lang="en-US" altLang="en-US" sz="2400" dirty="0">
-                <a:solidFill>
-                  <a:srgbClr val="C00000"/>
-                </a:solidFill>
-              </a:rPr>
-              <a:t>lack of action to correct the problem</a:t>
-            </a:r>
-            <a:endParaRPr lang="en-US" altLang="en-US" sz="1600" dirty="0">
-              <a:solidFill>
-                <a:srgbClr val="C00000"/>
-              </a:solidFill>
-            </a:endParaRPr>
-          </a:p>
-        </p:txBody>
-      </p:sp>
-      <p:sp>
-        <p:nvSpPr>
-          <p:cNvPr id="24579" name="Text Box 3">
-            <a:extLst>
-              <a:ext uri="{FF2B5EF4-FFF2-40B4-BE49-F238E27FC236}">
-                <a16:creationId xmlns:a16="http://schemas.microsoft.com/office/drawing/2014/main" id="{C1802033-C70C-401D-81D8-90438BC62471}"/>
-              </a:ext>
-            </a:extLst>
-          </p:cNvPr>
-          <p:cNvSpPr txBox="1">
-            <a:spLocks/>
-          </p:cNvSpPr>
-          <p:nvPr/>
-        </p:nvSpPr>
-        <p:spPr bwMode="auto">
-          <a:xfrm>
-            <a:off x="11084571" y="6412602"/>
-            <a:ext cx="213200" cy="223587"/>
-          </a:xfrm>
-          <a:prstGeom prst="rect">
-            <a:avLst/>
-          </a:prstGeom>
-          <a:noFill/>
-          <a:ln>
-            <a:noFill/>
-          </a:ln>
-          <a:effectLst/>
-          <a:extLst>
-            <a:ext uri="{909E8E84-426E-40DD-AFC4-6F175D3DCCD1}">
-              <a14:hiddenFill xmlns:a14="http://schemas.microsoft.com/office/drawing/2010/main">
-                <a:solidFill>
-                  <a:srgbClr val="FFFFFF"/>
-                </a:solidFill>
-              </a14:hiddenFill>
-            </a:ext>
-            <a:ext uri="{91240B29-F687-4F45-9708-019B960494DF}">
-              <a14:hiddenLine xmlns:a14="http://schemas.microsoft.com/office/drawing/2010/main" w="12700" cap="flat" cmpd="sng">
-                <a:solidFill>
-                  <a:srgbClr val="000000"/>
-                </a:solidFill>
-                <a:prstDash val="solid"/>
-                <a:miter lim="400000"/>
-                <a:headEnd type="none" w="med" len="med"/>
-                <a:tailEnd type="none" w="med" len="med"/>
-              </a14:hiddenLine>
-            </a:ext>
-            <a:ext uri="{AF507438-7753-43E0-B8FC-AC1667EBCBE1}">
-              <a14:hiddenEffects xmlns:a14="http://schemas.microsoft.com/office/drawing/2010/main">
-                <a:effectLst>
-                  <a:outerShdw dist="35921" dir="2700000" algn="ctr" rotWithShape="0">
-                    <a:srgbClr val="808080"/>
-                  </a:outerShdw>
-                </a:effectLst>
-              </a14:hiddenEffects>
-            </a:ext>
-          </a:extLst>
-        </p:spPr>
-        <p:txBody>
-          <a:bodyPr wrap="none" lIns="35719" tIns="35719" rIns="35719" bIns="35719" anchor="b">
-            <a:spAutoFit/>
-          </a:bodyPr>
-          <a:lstStyle/>
-          <a:p>
-            <a:pPr algn="r" defTabSz="410751" fontAlgn="base" hangingPunct="0">
-              <a:spcBef>
-                <a:spcPct val="0"/>
-              </a:spcBef>
-              <a:spcAft>
-                <a:spcPct val="0"/>
-              </a:spcAft>
-            </a:pPr>
-            <a:fld id="{DF5F2E70-75DF-449F-9F16-8040D1128174}" type="slidenum">
-              <a:rPr lang="en-US" altLang="en-US" sz="984">
-                <a:solidFill>
-                  <a:srgbClr val="000000"/>
-                </a:solidFill>
-                <a:latin typeface="Helvetica Neue"/>
-                <a:ea typeface="Helvetica Neue"/>
-                <a:cs typeface="Helvetica Neue"/>
-                <a:sym typeface="Helvetica Neue"/>
-              </a:rPr>
-              <a:pPr algn="r" defTabSz="410751" fontAlgn="base" hangingPunct="0">
-                <a:spcBef>
-                  <a:spcPct val="0"/>
-                </a:spcBef>
-                <a:spcAft>
-                  <a:spcPct val="0"/>
-                </a:spcAft>
-              </a:pPr>
+          <a:bodyPr/>
+          <a:lstStyle/>
+          <a:p>
+            <a:r>
+              <a:rPr lang="en-US" dirty="0"/>
+              <a:t>Learning Goals for this Lesson</a:t>
+            </a:r>
+          </a:p>
+        </p:txBody>
+      </p:sp>
+      <p:sp>
+        <p:nvSpPr>
+          <p:cNvPr id="3" name="Content Placeholder 2">
+            <a:extLst>
+              <a:ext uri="{FF2B5EF4-FFF2-40B4-BE49-F238E27FC236}">
+                <a16:creationId xmlns:a16="http://schemas.microsoft.com/office/drawing/2014/main" id="{AC300E2B-BFD0-4090-AFC5-FE82683F997F}"/>
+              </a:ext>
+            </a:extLst>
+          </p:cNvPr>
+          <p:cNvSpPr>
+            <a:spLocks noGrp="1"/>
+          </p:cNvSpPr>
+          <p:nvPr>
+            <p:ph idx="1"/>
+          </p:nvPr>
+        </p:nvSpPr>
+        <p:spPr/>
+        <p:txBody>
+          <a:bodyPr/>
+          <a:lstStyle/>
+          <a:p>
+            <a:r>
+              <a:rPr lang="en-US" dirty="0"/>
+              <a:t>At the end of this lesson, you should be able to</a:t>
+            </a:r>
+          </a:p>
+          <a:p>
+            <a:pPr lvl="1"/>
+            <a:r>
+              <a:rPr lang="en-US" dirty="0"/>
+              <a:t>Describe how agile planning manages uncertainty by creating detailed plans only for the most immediate tasks</a:t>
+            </a:r>
+          </a:p>
+          <a:p>
+            <a:pPr lvl="1"/>
+            <a:r>
+              <a:rPr lang="en-US" dirty="0"/>
+              <a:t>Explain how agile planning decomposes large projects into individual tasks that can be estimated</a:t>
+            </a:r>
+          </a:p>
+          <a:p>
+            <a:pPr lvl="1"/>
+            <a:r>
+              <a:rPr lang="en-US" dirty="0"/>
+              <a:t>Understand the key artifacts and process steps in Scrum</a:t>
+            </a:r>
+          </a:p>
+        </p:txBody>
+      </p:sp>
+      <p:sp>
+        <p:nvSpPr>
+          <p:cNvPr id="4" name="Slide Number Placeholder 3">
+            <a:extLst>
+              <a:ext uri="{FF2B5EF4-FFF2-40B4-BE49-F238E27FC236}">
+                <a16:creationId xmlns:a16="http://schemas.microsoft.com/office/drawing/2014/main" id="{B7BF3F82-6F96-41E0-9C15-23CE00076176}"/>
+              </a:ext>
+            </a:extLst>
+          </p:cNvPr>
+          <p:cNvSpPr>
+            <a:spLocks noGrp="1"/>
+          </p:cNvSpPr>
+          <p:nvPr>
+            <p:ph type="sldNum" sz="quarter" idx="12"/>
+          </p:nvPr>
+        </p:nvSpPr>
+        <p:spPr/>
+        <p:txBody>
+          <a:bodyPr/>
+          <a:lstStyle/>
+          <a:p>
+            <a:fld id="{20F37917-FD3A-4669-9018-DA04BCDD3D75}" type="slidenum">
+              <a:rPr lang="en-US" smtClean="0"/>
               <a:t>19</a:t>
             </a:fld>
-            <a:endParaRPr lang="en-US" altLang="en-US" sz="984">
-              <a:solidFill>
-                <a:srgbClr val="000000"/>
-              </a:solidFill>
-              <a:latin typeface="Helvetica Neue"/>
-              <a:ea typeface="Helvetica Neue"/>
-              <a:cs typeface="Helvetica Neue"/>
-              <a:sym typeface="Helvetica Neue"/>
-            </a:endParaRPr>
+            <a:endParaRPr lang="en-US"/>
           </a:p>
         </p:txBody>
       </p:sp>
     </p:spTree>
+    <p:extLst>
+      <p:ext uri="{BB962C8B-B14F-4D97-AF65-F5344CB8AC3E}">
+        <p14:creationId xmlns:p14="http://schemas.microsoft.com/office/powerpoint/2010/main" val="1694982008"/>
+      </p:ext>
+    </p:extLst>
   </p:cSld>
   <p:clrMapOvr>
     <a:masterClrMapping/>
@@ -10308,142 +10155,6 @@
     <p:extLst>
       <p:ext uri="{BB962C8B-B14F-4D97-AF65-F5344CB8AC3E}">
         <p14:creationId xmlns:p14="http://schemas.microsoft.com/office/powerpoint/2010/main" val="3019279322"/>
-      </p:ext>
-    </p:extLst>
-  </p:cSld>
-  <p:clrMapOvr>
-    <a:masterClrMapping/>
-  </p:clrMapOvr>
-</p:sld>
-</file>
-
-<file path=ppt/slides/slide20.xml><?xml version="1.0" encoding="utf-8"?>
-<p:sld xmlns:a="http://schemas.openxmlformats.org/drawingml/2006/main" xmlns:r="http://schemas.openxmlformats.org/officeDocument/2006/relationships" xmlns:p="http://schemas.openxmlformats.org/presentationml/2006/main">
-  <p:cSld>
-    <p:spTree>
-      <p:nvGrpSpPr>
-        <p:cNvPr id="1" name=""/>
-        <p:cNvGrpSpPr/>
-        <p:nvPr/>
-      </p:nvGrpSpPr>
-      <p:grpSpPr>
-        <a:xfrm>
-          <a:off x="0" y="0"/>
-          <a:ext cx="0" cy="0"/>
-          <a:chOff x="0" y="0"/>
-          <a:chExt cx="0" cy="0"/>
-        </a:xfrm>
-      </p:grpSpPr>
-      <p:sp>
-        <p:nvSpPr>
-          <p:cNvPr id="2" name="Title 1">
-            <a:extLst>
-              <a:ext uri="{FF2B5EF4-FFF2-40B4-BE49-F238E27FC236}">
-                <a16:creationId xmlns:a16="http://schemas.microsoft.com/office/drawing/2014/main" id="{E743D407-5B53-49A7-9907-E801EA7FFD8E}"/>
-              </a:ext>
-            </a:extLst>
-          </p:cNvPr>
-          <p:cNvSpPr>
-            <a:spLocks noGrp="1"/>
-          </p:cNvSpPr>
-          <p:nvPr>
-            <p:ph type="title"/>
-          </p:nvPr>
-        </p:nvSpPr>
-        <p:spPr/>
-        <p:txBody>
-          <a:bodyPr/>
-          <a:lstStyle/>
-          <a:p>
-            <a:r>
-              <a:rPr lang="en-US" dirty="0"/>
-              <a:t>Learning Goals for this Lesson</a:t>
-            </a:r>
-          </a:p>
-        </p:txBody>
-      </p:sp>
-      <p:sp>
-        <p:nvSpPr>
-          <p:cNvPr id="3" name="Content Placeholder 2">
-            <a:extLst>
-              <a:ext uri="{FF2B5EF4-FFF2-40B4-BE49-F238E27FC236}">
-                <a16:creationId xmlns:a16="http://schemas.microsoft.com/office/drawing/2014/main" id="{AC300E2B-BFD0-4090-AFC5-FE82683F997F}"/>
-              </a:ext>
-            </a:extLst>
-          </p:cNvPr>
-          <p:cNvSpPr>
-            <a:spLocks noGrp="1"/>
-          </p:cNvSpPr>
-          <p:nvPr>
-            <p:ph idx="1"/>
-          </p:nvPr>
-        </p:nvSpPr>
-        <p:spPr/>
-        <p:txBody>
-          <a:bodyPr/>
-          <a:lstStyle/>
-          <a:p>
-            <a:r>
-              <a:rPr lang="en-US" dirty="0"/>
-              <a:t>At the end of this lesson, you should be able to</a:t>
-            </a:r>
-          </a:p>
-          <a:p>
-            <a:pPr lvl="1"/>
-            <a:r>
-              <a:rPr lang="en-US" dirty="0"/>
-              <a:t>Describe how agile planning manages uncertainty by creating detailed plans only for the most immediate tasks</a:t>
-            </a:r>
-          </a:p>
-          <a:p>
-            <a:pPr lvl="1"/>
-            <a:r>
-              <a:rPr lang="en-US" dirty="0"/>
-              <a:t>Explain how agile planning decomposes large projects into individual tasks that can be estimated</a:t>
-            </a:r>
-          </a:p>
-          <a:p>
-            <a:pPr lvl="1"/>
-            <a:r>
-              <a:rPr lang="en-US" dirty="0"/>
-              <a:t>Understand the key artifacts and process steps in Scrum</a:t>
-            </a:r>
-          </a:p>
-        </p:txBody>
-      </p:sp>
-      <p:sp>
-        <p:nvSpPr>
-          <p:cNvPr id="4" name="Slide Number Placeholder 3">
-            <a:extLst>
-              <a:ext uri="{FF2B5EF4-FFF2-40B4-BE49-F238E27FC236}">
-                <a16:creationId xmlns:a16="http://schemas.microsoft.com/office/drawing/2014/main" id="{B7BF3F82-6F96-41E0-9C15-23CE00076176}"/>
-              </a:ext>
-            </a:extLst>
-          </p:cNvPr>
-          <p:cNvSpPr>
-            <a:spLocks noGrp="1"/>
-          </p:cNvSpPr>
-          <p:nvPr>
-            <p:ph type="sldNum" sz="quarter" idx="12"/>
-          </p:nvPr>
-        </p:nvSpPr>
-        <p:spPr/>
-        <p:txBody>
-          <a:bodyPr/>
-          <a:lstStyle/>
-          <a:p>
-            <a:fld id="{20F37917-FD3A-4669-9018-DA04BCDD3D75}" type="slidenum">
-              <a:rPr lang="en-US" smtClean="0"/>
-              <a:t>20</a:t>
-            </a:fld>
-            <a:endParaRPr lang="en-US"/>
-          </a:p>
-        </p:txBody>
-      </p:sp>
-    </p:spTree>
-    <p:extLst>
-      <p:ext uri="{BB962C8B-B14F-4D97-AF65-F5344CB8AC3E}">
-        <p14:creationId xmlns:p14="http://schemas.microsoft.com/office/powerpoint/2010/main" val="1694982008"/>
       </p:ext>
     </p:extLst>
   </p:cSld>

</xml_diff>